<commit_message>
ajout des fichiers java du patron adaptateur
</commit_message>
<xml_diff>
--- a/Annee2/S3/R3_10_Gestion/CM3.pptx
+++ b/Annee2/S3/R3_10_Gestion/CM3.pptx
@@ -142,14 +142,6 @@
     </p:ext>
   </p:extLst>
 </p:presentation>
-</file>
-
-<file path=ppt/revisionInfo.xml><?xml version="1.0" encoding="utf-8"?>
-<p1510:revInfo xmlns:a="http://schemas.openxmlformats.org/drawingml/2006/main" xmlns:r="http://schemas.openxmlformats.org/officeDocument/2006/relationships" xmlns:p1510="http://schemas.microsoft.com/office/powerpoint/2015/10/main">
-  <p1510:revLst>
-    <p1510:client id="{375E5702-07D9-4515-A519-C60617010C35}" v="120" dt="2022-10-09T15:35:56.009"/>
-  </p1510:revLst>
-</p1510:revInfo>
 </file>
 
 <file path=ppt/changesInfos/changesInfo1.xml><?xml version="1.0" encoding="utf-8"?>
@@ -593,6 +585,90 @@
             <pc:docMk/>
             <pc:sldMk cId="1317881666" sldId="289"/>
             <ac:spMk id="3" creationId="{27356B63-20FE-779C-9829-C3C901F90982}"/>
+          </ac:spMkLst>
+        </pc:spChg>
+      </pc:sldChg>
+    </pc:docChg>
+  </pc:docChgLst>
+  <pc:docChgLst>
+    <pc:chgData name="Maxime Montouro" userId="e4dc91ef86edc8ba" providerId="LiveId" clId="{C4E57073-B70A-43D9-9FAA-5ED7AEE16359}"/>
+    <pc:docChg chg="custSel modSld">
+      <pc:chgData name="Maxime Montouro" userId="e4dc91ef86edc8ba" providerId="LiveId" clId="{C4E57073-B70A-43D9-9FAA-5ED7AEE16359}" dt="2023-12-13T16:55:46.386" v="6" actId="1036"/>
+      <pc:docMkLst>
+        <pc:docMk/>
+      </pc:docMkLst>
+      <pc:sldChg chg="modSp mod">
+        <pc:chgData name="Maxime Montouro" userId="e4dc91ef86edc8ba" providerId="LiveId" clId="{C4E57073-B70A-43D9-9FAA-5ED7AEE16359}" dt="2023-12-13T16:43:57.803" v="5" actId="20577"/>
+        <pc:sldMkLst>
+          <pc:docMk/>
+          <pc:sldMk cId="3945945268" sldId="273"/>
+        </pc:sldMkLst>
+        <pc:spChg chg="mod">
+          <ac:chgData name="Maxime Montouro" userId="e4dc91ef86edc8ba" providerId="LiveId" clId="{C4E57073-B70A-43D9-9FAA-5ED7AEE16359}" dt="2023-12-13T16:43:57.803" v="5" actId="20577"/>
+          <ac:spMkLst>
+            <pc:docMk/>
+            <pc:sldMk cId="3945945268" sldId="273"/>
+            <ac:spMk id="3" creationId="{00000000-0000-0000-0000-000000000000}"/>
+          </ac:spMkLst>
+        </pc:spChg>
+      </pc:sldChg>
+      <pc:sldChg chg="modSp mod">
+        <pc:chgData name="Maxime Montouro" userId="e4dc91ef86edc8ba" providerId="LiveId" clId="{C4E57073-B70A-43D9-9FAA-5ED7AEE16359}" dt="2023-12-13T16:14:00.961" v="0" actId="33524"/>
+        <pc:sldMkLst>
+          <pc:docMk/>
+          <pc:sldMk cId="2160402836" sldId="276"/>
+        </pc:sldMkLst>
+        <pc:spChg chg="mod">
+          <ac:chgData name="Maxime Montouro" userId="e4dc91ef86edc8ba" providerId="LiveId" clId="{C4E57073-B70A-43D9-9FAA-5ED7AEE16359}" dt="2023-12-13T16:14:00.961" v="0" actId="33524"/>
+          <ac:spMkLst>
+            <pc:docMk/>
+            <pc:sldMk cId="2160402836" sldId="276"/>
+            <ac:spMk id="3" creationId="{00000000-0000-0000-0000-000000000000}"/>
+          </ac:spMkLst>
+        </pc:spChg>
+      </pc:sldChg>
+      <pc:sldChg chg="modSp mod">
+        <pc:chgData name="Maxime Montouro" userId="e4dc91ef86edc8ba" providerId="LiveId" clId="{C4E57073-B70A-43D9-9FAA-5ED7AEE16359}" dt="2023-12-13T16:28:33.825" v="1" actId="20577"/>
+        <pc:sldMkLst>
+          <pc:docMk/>
+          <pc:sldMk cId="538926749" sldId="284"/>
+        </pc:sldMkLst>
+        <pc:spChg chg="mod">
+          <ac:chgData name="Maxime Montouro" userId="e4dc91ef86edc8ba" providerId="LiveId" clId="{C4E57073-B70A-43D9-9FAA-5ED7AEE16359}" dt="2023-12-13T16:28:33.825" v="1" actId="20577"/>
+          <ac:spMkLst>
+            <pc:docMk/>
+            <pc:sldMk cId="538926749" sldId="284"/>
+            <ac:spMk id="3" creationId="{FD6DD42F-6B0B-4B6F-4C00-DFE2D390BFB4}"/>
+          </ac:spMkLst>
+        </pc:spChg>
+      </pc:sldChg>
+      <pc:sldChg chg="modSp mod">
+        <pc:chgData name="Maxime Montouro" userId="e4dc91ef86edc8ba" providerId="LiveId" clId="{C4E57073-B70A-43D9-9FAA-5ED7AEE16359}" dt="2023-12-13T16:37:40.908" v="2" actId="33524"/>
+        <pc:sldMkLst>
+          <pc:docMk/>
+          <pc:sldMk cId="2752709916" sldId="285"/>
+        </pc:sldMkLst>
+        <pc:spChg chg="mod">
+          <ac:chgData name="Maxime Montouro" userId="e4dc91ef86edc8ba" providerId="LiveId" clId="{C4E57073-B70A-43D9-9FAA-5ED7AEE16359}" dt="2023-12-13T16:37:40.908" v="2" actId="33524"/>
+          <ac:spMkLst>
+            <pc:docMk/>
+            <pc:sldMk cId="2752709916" sldId="285"/>
+            <ac:spMk id="3" creationId="{0654C83C-23FD-DE2B-7E91-F1EEF66C804A}"/>
+          </ac:spMkLst>
+        </pc:spChg>
+      </pc:sldChg>
+      <pc:sldChg chg="modSp mod">
+        <pc:chgData name="Maxime Montouro" userId="e4dc91ef86edc8ba" providerId="LiveId" clId="{C4E57073-B70A-43D9-9FAA-5ED7AEE16359}" dt="2023-12-13T16:55:46.386" v="6" actId="1036"/>
+        <pc:sldMkLst>
+          <pc:docMk/>
+          <pc:sldMk cId="4158246547" sldId="287"/>
+        </pc:sldMkLst>
+        <pc:spChg chg="mod">
+          <ac:chgData name="Maxime Montouro" userId="e4dc91ef86edc8ba" providerId="LiveId" clId="{C4E57073-B70A-43D9-9FAA-5ED7AEE16359}" dt="2023-12-13T16:55:46.386" v="6" actId="1036"/>
+          <ac:spMkLst>
+            <pc:docMk/>
+            <pc:sldMk cId="4158246547" sldId="287"/>
+            <ac:spMk id="2" creationId="{0A76CC7C-E13A-3E10-1FEC-64A9B65401D2}"/>
           </ac:spMkLst>
         </pc:spChg>
       </pc:sldChg>
@@ -6282,7 +6358,7 @@
           <a:p>
             <a:fld id="{B49DC243-5E6A-4515-934B-7EEE2E64E53B}" type="datetimeFigureOut">
               <a:rPr lang="fr-FR" smtClean="0"/>
-              <a:t>09/10/2022</a:t>
+              <a:t>13/12/2023</a:t>
             </a:fld>
             <a:endParaRPr lang="fr-FR"/>
           </a:p>
@@ -6450,7 +6526,7 @@
           <a:p>
             <a:fld id="{B49DC243-5E6A-4515-934B-7EEE2E64E53B}" type="datetimeFigureOut">
               <a:rPr lang="fr-FR" smtClean="0"/>
-              <a:t>09/10/2022</a:t>
+              <a:t>13/12/2023</a:t>
             </a:fld>
             <a:endParaRPr lang="fr-FR"/>
           </a:p>
@@ -6628,7 +6704,7 @@
           <a:p>
             <a:fld id="{B49DC243-5E6A-4515-934B-7EEE2E64E53B}" type="datetimeFigureOut">
               <a:rPr lang="fr-FR" smtClean="0"/>
-              <a:t>09/10/2022</a:t>
+              <a:t>13/12/2023</a:t>
             </a:fld>
             <a:endParaRPr lang="fr-FR"/>
           </a:p>
@@ -6796,7 +6872,7 @@
           <a:p>
             <a:fld id="{B49DC243-5E6A-4515-934B-7EEE2E64E53B}" type="datetimeFigureOut">
               <a:rPr lang="fr-FR" smtClean="0"/>
-              <a:t>09/10/2022</a:t>
+              <a:t>13/12/2023</a:t>
             </a:fld>
             <a:endParaRPr lang="fr-FR"/>
           </a:p>
@@ -7041,7 +7117,7 @@
           <a:p>
             <a:fld id="{B49DC243-5E6A-4515-934B-7EEE2E64E53B}" type="datetimeFigureOut">
               <a:rPr lang="fr-FR" smtClean="0"/>
-              <a:t>09/10/2022</a:t>
+              <a:t>13/12/2023</a:t>
             </a:fld>
             <a:endParaRPr lang="fr-FR"/>
           </a:p>
@@ -7270,7 +7346,7 @@
           <a:p>
             <a:fld id="{B49DC243-5E6A-4515-934B-7EEE2E64E53B}" type="datetimeFigureOut">
               <a:rPr lang="fr-FR" smtClean="0"/>
-              <a:t>09/10/2022</a:t>
+              <a:t>13/12/2023</a:t>
             </a:fld>
             <a:endParaRPr lang="fr-FR"/>
           </a:p>
@@ -7634,7 +7710,7 @@
           <a:p>
             <a:fld id="{B49DC243-5E6A-4515-934B-7EEE2E64E53B}" type="datetimeFigureOut">
               <a:rPr lang="fr-FR" smtClean="0"/>
-              <a:t>09/10/2022</a:t>
+              <a:t>13/12/2023</a:t>
             </a:fld>
             <a:endParaRPr lang="fr-FR"/>
           </a:p>
@@ -7751,7 +7827,7 @@
           <a:p>
             <a:fld id="{B49DC243-5E6A-4515-934B-7EEE2E64E53B}" type="datetimeFigureOut">
               <a:rPr lang="fr-FR" smtClean="0"/>
-              <a:t>09/10/2022</a:t>
+              <a:t>13/12/2023</a:t>
             </a:fld>
             <a:endParaRPr lang="fr-FR"/>
           </a:p>
@@ -7846,7 +7922,7 @@
           <a:p>
             <a:fld id="{B49DC243-5E6A-4515-934B-7EEE2E64E53B}" type="datetimeFigureOut">
               <a:rPr lang="fr-FR" smtClean="0"/>
-              <a:t>09/10/2022</a:t>
+              <a:t>13/12/2023</a:t>
             </a:fld>
             <a:endParaRPr lang="fr-FR"/>
           </a:p>
@@ -8121,7 +8197,7 @@
           <a:p>
             <a:fld id="{B49DC243-5E6A-4515-934B-7EEE2E64E53B}" type="datetimeFigureOut">
               <a:rPr lang="fr-FR" smtClean="0"/>
-              <a:t>09/10/2022</a:t>
+              <a:t>13/12/2023</a:t>
             </a:fld>
             <a:endParaRPr lang="fr-FR"/>
           </a:p>
@@ -8373,7 +8449,7 @@
           <a:p>
             <a:fld id="{B49DC243-5E6A-4515-934B-7EEE2E64E53B}" type="datetimeFigureOut">
               <a:rPr lang="fr-FR" smtClean="0"/>
-              <a:t>09/10/2022</a:t>
+              <a:t>13/12/2023</a:t>
             </a:fld>
             <a:endParaRPr lang="fr-FR"/>
           </a:p>
@@ -8584,7 +8660,7 @@
           <a:p>
             <a:fld id="{B49DC243-5E6A-4515-934B-7EEE2E64E53B}" type="datetimeFigureOut">
               <a:rPr lang="fr-FR" smtClean="0"/>
-              <a:t>09/10/2022</a:t>
+              <a:t>13/12/2023</a:t>
             </a:fld>
             <a:endParaRPr lang="fr-FR"/>
           </a:p>
@@ -9751,7 +9827,7 @@
           <a:p>
             <a:r>
               <a:rPr lang="fr-FR" dirty="0"/>
-              <a:t>Une crise peut être la conséquences de conflits ou survenir à cause d’éléments extérieurs (problèmes financiers, catastrophe naturelle, problèmes techniques ou environnementaux…</a:t>
+              <a:t>Une crise peut être la conséquence de conflits ou survenir à cause d’éléments extérieurs (problèmes financiers, catastrophe naturelle, problèmes techniques ou environnementaux…</a:t>
             </a:r>
           </a:p>
           <a:p>
@@ -10082,7 +10158,7 @@
             <a:pPr lvl="1"/>
             <a:r>
               <a:rPr lang="fr-FR" dirty="0"/>
-              <a:t>Être capable de s’adapter, d’être agile pour modifier ses procédure, ses habitudes</a:t>
+              <a:t>Être capable de s’adapter, d’être agile pour modifier ses procédures, ses habitudes</a:t>
             </a:r>
           </a:p>
           <a:p>
@@ -10670,21 +10746,21 @@
             <a:pPr lvl="1"/>
             <a:r>
               <a:rPr lang="fr-FR" dirty="0"/>
-              <a:t>L’acteur de l’organisation a une dimension humaine ce qui provoque des réactions, des comportement d’ordre affectif et sentimental parfois en contradiction avec la logique rationnelle de l’entreprise</a:t>
+              <a:t>L’acteur de l’organisation a une dimension humaine ce qui provoque des réactions, des comportements d’ordre affectif et sentimental parfois en contradiction avec la logique rationnelle de l’entreprise</a:t>
             </a:r>
           </a:p>
           <a:p>
             <a:pPr lvl="1"/>
             <a:r>
               <a:rPr lang="fr-FR" dirty="0"/>
-              <a:t>Les condition de travail matérielles et psychologiques doivent être prises en considération pour rendre les acteurs plus efficaces.</a:t>
+              <a:t>Les conditions de travail matérielles et psychologiques doivent être prises en considération pour rendre les acteurs plus efficaces.</a:t>
             </a:r>
           </a:p>
           <a:p>
             <a:pPr lvl="1"/>
             <a:r>
               <a:rPr lang="fr-FR" dirty="0"/>
-              <a:t>Les groupes à l’intérieur des entreprise influencent celles ci</a:t>
+              <a:t>Les groupes à l’intérieur des entreprises influencent celles ci</a:t>
             </a:r>
           </a:p>
           <a:p>
@@ -10841,7 +10917,12 @@
             <p:ph type="title"/>
           </p:nvPr>
         </p:nvSpPr>
-        <p:spPr/>
+        <p:spPr>
+          <a:xfrm>
+            <a:off x="838200" y="374456"/>
+            <a:ext cx="10515600" cy="1325563"/>
+          </a:xfrm>
+        </p:spPr>
         <p:txBody>
           <a:bodyPr/>
           <a:lstStyle/>
@@ -12189,7 +12270,7 @@
           <a:p>
             <a:r>
               <a:rPr lang="fr-FR" dirty="0"/>
-              <a:t>Puis comme un cerveaux qui a des objectifs des idées</a:t>
+              <a:t>Puis comme un cerveau qui a des objectifs des idées</a:t>
             </a:r>
           </a:p>
           <a:p>
@@ -12652,15 +12733,6 @@
 </file>
 
 <file path=customXml/item1.xml><?xml version="1.0" encoding="utf-8"?>
-<?mso-contentType ?>
-<FormTemplates xmlns="http://schemas.microsoft.com/sharepoint/v3/contenttype/forms">
-  <Display>DocumentLibraryForm</Display>
-  <Edit>DocumentLibraryForm</Edit>
-  <New>DocumentLibraryForm</New>
-</FormTemplates>
-</file>
-
-<file path=customXml/item2.xml><?xml version="1.0" encoding="utf-8"?>
 <ct:contentTypeSchema xmlns:ct="http://schemas.microsoft.com/office/2006/metadata/contentType" xmlns:ma="http://schemas.microsoft.com/office/2006/metadata/properties/metaAttributes" ct:_="" ma:_="" ma:contentTypeName="Document" ma:contentTypeID="0x010100174DE523C18DD04AA3DC7A64EF303CDB" ma:contentTypeVersion="9" ma:contentTypeDescription="Crée un document." ma:contentTypeScope="" ma:versionID="d55431529f68e2c4a5158d821766a1a5">
   <xsd:schema xmlns:xsd="http://www.w3.org/2001/XMLSchema" xmlns:xs="http://www.w3.org/2001/XMLSchema" xmlns:p="http://schemas.microsoft.com/office/2006/metadata/properties" xmlns:ns3="2eb18c24-ff85-4648-aa2d-dc8f8a313da7" targetNamespace="http://schemas.microsoft.com/office/2006/metadata/properties" ma:root="true" ma:fieldsID="1bcd225d5c7ff501594a13186064d0e2" ns3:_="">
     <xsd:import namespace="2eb18c24-ff85-4648-aa2d-dc8f8a313da7"/>
@@ -12836,6 +12908,15 @@
 </ct:contentTypeSchema>
 </file>
 
+<file path=customXml/item2.xml><?xml version="1.0" encoding="utf-8"?>
+<?mso-contentType ?>
+<FormTemplates xmlns="http://schemas.microsoft.com/sharepoint/v3/contenttype/forms">
+  <Display>DocumentLibraryForm</Display>
+  <Edit>DocumentLibraryForm</Edit>
+  <New>DocumentLibraryForm</New>
+</FormTemplates>
+</file>
+
 <file path=customXml/item3.xml><?xml version="1.0" encoding="utf-8"?>
 <p:properties xmlns:p="http://schemas.microsoft.com/office/2006/metadata/properties" xmlns:xsi="http://www.w3.org/2001/XMLSchema-instance" xmlns:pc="http://schemas.microsoft.com/office/infopath/2007/PartnerControls">
   <documentManagement/>
@@ -12843,14 +12924,6 @@
 </file>
 
 <file path=customXml/itemProps1.xml><?xml version="1.0" encoding="utf-8"?>
-<ds:datastoreItem xmlns:ds="http://schemas.openxmlformats.org/officeDocument/2006/customXml" ds:itemID="{D076FDD9-9356-49D3-A215-9F78768ACFA7}">
-  <ds:schemaRefs>
-    <ds:schemaRef ds:uri="http://schemas.microsoft.com/sharepoint/v3/contenttype/forms"/>
-  </ds:schemaRefs>
-</ds:datastoreItem>
-</file>
-
-<file path=customXml/itemProps2.xml><?xml version="1.0" encoding="utf-8"?>
 <ds:datastoreItem xmlns:ds="http://schemas.openxmlformats.org/officeDocument/2006/customXml" ds:itemID="{FDA44271-ADC3-4825-B89C-1646FB3D4F7F}">
   <ds:schemaRefs>
     <ds:schemaRef ds:uri="http://schemas.microsoft.com/office/2006/metadata/contentType"/>
@@ -12864,6 +12937,14 @@
     <ds:schemaRef ds:uri="http://purl.org/dc/elements/1.1/"/>
     <ds:schemaRef ds:uri="http://purl.org/dc/terms/"/>
     <ds:schemaRef ds:uri="http://schemas.microsoft.com/internal/obd"/>
+  </ds:schemaRefs>
+</ds:datastoreItem>
+</file>
+
+<file path=customXml/itemProps2.xml><?xml version="1.0" encoding="utf-8"?>
+<ds:datastoreItem xmlns:ds="http://schemas.openxmlformats.org/officeDocument/2006/customXml" ds:itemID="{D076FDD9-9356-49D3-A215-9F78768ACFA7}">
+  <ds:schemaRefs>
+    <ds:schemaRef ds:uri="http://schemas.microsoft.com/sharepoint/v3/contenttype/forms"/>
   </ds:schemaRefs>
 </ds:datastoreItem>
 </file>

</xml_diff>